<commit_message>
Update ADS and System Context diagram.
</commit_message>
<xml_diff>
--- a/doc/SurePark_SystemContext.pptx
+++ b/doc/SurePark_SystemContext.pptx
@@ -245,7 +245,7 @@
           <a:p>
             <a:fld id="{49277F6E-2480-46A3-8EDF-7DF40D586476}" type="datetimeFigureOut">
               <a:rPr lang="ko-KR" altLang="en-US" smtClean="0"/>
-              <a:t>2016-05-31</a:t>
+              <a:t>2016. 5. 31.</a:t>
             </a:fld>
             <a:endParaRPr lang="ko-KR" altLang="en-US"/>
           </a:p>
@@ -415,7 +415,7 @@
           <a:p>
             <a:fld id="{49277F6E-2480-46A3-8EDF-7DF40D586476}" type="datetimeFigureOut">
               <a:rPr lang="ko-KR" altLang="en-US" smtClean="0"/>
-              <a:t>2016-05-31</a:t>
+              <a:t>2016. 5. 31.</a:t>
             </a:fld>
             <a:endParaRPr lang="ko-KR" altLang="en-US"/>
           </a:p>
@@ -595,7 +595,7 @@
           <a:p>
             <a:fld id="{49277F6E-2480-46A3-8EDF-7DF40D586476}" type="datetimeFigureOut">
               <a:rPr lang="ko-KR" altLang="en-US" smtClean="0"/>
-              <a:t>2016-05-31</a:t>
+              <a:t>2016. 5. 31.</a:t>
             </a:fld>
             <a:endParaRPr lang="ko-KR" altLang="en-US"/>
           </a:p>
@@ -765,7 +765,7 @@
           <a:p>
             <a:fld id="{49277F6E-2480-46A3-8EDF-7DF40D586476}" type="datetimeFigureOut">
               <a:rPr lang="ko-KR" altLang="en-US" smtClean="0"/>
-              <a:t>2016-05-31</a:t>
+              <a:t>2016. 5. 31.</a:t>
             </a:fld>
             <a:endParaRPr lang="ko-KR" altLang="en-US"/>
           </a:p>
@@ -1011,7 +1011,7 @@
           <a:p>
             <a:fld id="{49277F6E-2480-46A3-8EDF-7DF40D586476}" type="datetimeFigureOut">
               <a:rPr lang="ko-KR" altLang="en-US" smtClean="0"/>
-              <a:t>2016-05-31</a:t>
+              <a:t>2016. 5. 31.</a:t>
             </a:fld>
             <a:endParaRPr lang="ko-KR" altLang="en-US"/>
           </a:p>
@@ -1243,7 +1243,7 @@
           <a:p>
             <a:fld id="{49277F6E-2480-46A3-8EDF-7DF40D586476}" type="datetimeFigureOut">
               <a:rPr lang="ko-KR" altLang="en-US" smtClean="0"/>
-              <a:t>2016-05-31</a:t>
+              <a:t>2016. 5. 31.</a:t>
             </a:fld>
             <a:endParaRPr lang="ko-KR" altLang="en-US"/>
           </a:p>
@@ -1610,7 +1610,7 @@
           <a:p>
             <a:fld id="{49277F6E-2480-46A3-8EDF-7DF40D586476}" type="datetimeFigureOut">
               <a:rPr lang="ko-KR" altLang="en-US" smtClean="0"/>
-              <a:t>2016-05-31</a:t>
+              <a:t>2016. 5. 31.</a:t>
             </a:fld>
             <a:endParaRPr lang="ko-KR" altLang="en-US"/>
           </a:p>
@@ -1728,7 +1728,7 @@
           <a:p>
             <a:fld id="{49277F6E-2480-46A3-8EDF-7DF40D586476}" type="datetimeFigureOut">
               <a:rPr lang="ko-KR" altLang="en-US" smtClean="0"/>
-              <a:t>2016-05-31</a:t>
+              <a:t>2016. 5. 31.</a:t>
             </a:fld>
             <a:endParaRPr lang="ko-KR" altLang="en-US"/>
           </a:p>
@@ -1823,7 +1823,7 @@
           <a:p>
             <a:fld id="{49277F6E-2480-46A3-8EDF-7DF40D586476}" type="datetimeFigureOut">
               <a:rPr lang="ko-KR" altLang="en-US" smtClean="0"/>
-              <a:t>2016-05-31</a:t>
+              <a:t>2016. 5. 31.</a:t>
             </a:fld>
             <a:endParaRPr lang="ko-KR" altLang="en-US"/>
           </a:p>
@@ -2100,7 +2100,7 @@
           <a:p>
             <a:fld id="{49277F6E-2480-46A3-8EDF-7DF40D586476}" type="datetimeFigureOut">
               <a:rPr lang="ko-KR" altLang="en-US" smtClean="0"/>
-              <a:t>2016-05-31</a:t>
+              <a:t>2016. 5. 31.</a:t>
             </a:fld>
             <a:endParaRPr lang="ko-KR" altLang="en-US"/>
           </a:p>
@@ -2353,7 +2353,7 @@
           <a:p>
             <a:fld id="{49277F6E-2480-46A3-8EDF-7DF40D586476}" type="datetimeFigureOut">
               <a:rPr lang="ko-KR" altLang="en-US" smtClean="0"/>
-              <a:t>2016-05-31</a:t>
+              <a:t>2016. 5. 31.</a:t>
             </a:fld>
             <a:endParaRPr lang="ko-KR" altLang="en-US"/>
           </a:p>
@@ -2566,7 +2566,7 @@
           <a:p>
             <a:fld id="{49277F6E-2480-46A3-8EDF-7DF40D586476}" type="datetimeFigureOut">
               <a:rPr lang="ko-KR" altLang="en-US" smtClean="0"/>
-              <a:t>2016-05-31</a:t>
+              <a:t>2016. 5. 31.</a:t>
             </a:fld>
             <a:endParaRPr lang="ko-KR" altLang="en-US"/>
           </a:p>
@@ -4373,7 +4373,7 @@
           </p:nvSpPr>
           <p:spPr>
             <a:xfrm>
-              <a:off x="2550695" y="1660363"/>
+              <a:off x="2550695" y="2395468"/>
               <a:ext cx="1415163" cy="789102"/>
             </a:xfrm>
             <a:prstGeom prst="rect">
@@ -4422,7 +4422,15 @@
                     <a:schemeClr val="tx1"/>
                   </a:solidFill>
                 </a:rPr>
-                <a:t>Parking Garage 1</a:t>
+                <a:t>Parking </a:t>
+              </a:r>
+              <a:r>
+                <a:rPr lang="en-US" altLang="ko-KR" sz="1200" dirty="0" smtClean="0">
+                  <a:solidFill>
+                    <a:schemeClr val="tx1"/>
+                  </a:solidFill>
+                </a:rPr>
+                <a:t>Garage</a:t>
               </a:r>
               <a:endParaRPr lang="ko-KR" altLang="en-US" sz="1200" dirty="0">
                 <a:solidFill>
@@ -4612,90 +4620,15 @@
             </a:p>
           </p:txBody>
         </p:sp>
-        <p:sp>
-          <p:nvSpPr>
-            <p:cNvPr id="18" name="직사각형 17"/>
-            <p:cNvSpPr/>
-            <p:nvPr/>
-          </p:nvSpPr>
-          <p:spPr>
-            <a:xfrm>
-              <a:off x="2550695" y="3306131"/>
-              <a:ext cx="1439227" cy="773608"/>
-            </a:xfrm>
-            <a:prstGeom prst="rect">
-              <a:avLst/>
-            </a:prstGeom>
-            <a:solidFill>
-              <a:schemeClr val="bg1"/>
-            </a:solidFill>
-            <a:ln>
-              <a:solidFill>
-                <a:schemeClr val="tx1"/>
-              </a:solidFill>
-            </a:ln>
-            <a:effectLst>
-              <a:outerShdw blurRad="50800" dist="38100" dir="2700000" algn="tl" rotWithShape="0">
-                <a:prstClr val="black">
-                  <a:alpha val="40000"/>
-                </a:prstClr>
-              </a:outerShdw>
-            </a:effectLst>
-          </p:spPr>
-          <p:style>
-            <a:lnRef idx="2">
-              <a:schemeClr val="accent1">
-                <a:shade val="50000"/>
-              </a:schemeClr>
-            </a:lnRef>
-            <a:fillRef idx="1">
-              <a:schemeClr val="accent1"/>
-            </a:fillRef>
-            <a:effectRef idx="0">
-              <a:schemeClr val="accent1"/>
-            </a:effectRef>
-            <a:fontRef idx="minor">
-              <a:schemeClr val="lt1"/>
-            </a:fontRef>
-          </p:style>
-          <p:txBody>
-            <a:bodyPr rtlCol="0" anchor="ctr"/>
-            <a:lstStyle/>
-            <a:p>
-              <a:pPr algn="ctr"/>
-              <a:r>
-                <a:rPr lang="en-US" altLang="ko-KR" sz="1200" dirty="0">
-                  <a:solidFill>
-                    <a:schemeClr val="tx1"/>
-                  </a:solidFill>
-                </a:rPr>
-                <a:t>Parking Garage </a:t>
-              </a:r>
-              <a:r>
-                <a:rPr lang="en-US" altLang="ko-KR" sz="1200" dirty="0" smtClean="0">
-                  <a:solidFill>
-                    <a:schemeClr val="tx1"/>
-                  </a:solidFill>
-                </a:rPr>
-                <a:t>N</a:t>
-              </a:r>
-              <a:endParaRPr lang="ko-KR" altLang="en-US" sz="1200" dirty="0">
-                <a:solidFill>
-                  <a:schemeClr val="tx1"/>
-                </a:solidFill>
-              </a:endParaRPr>
-            </a:p>
-          </p:txBody>
-        </p:sp>
         <p:cxnSp>
           <p:nvCxnSpPr>
-            <p:cNvPr id="21" name="직선 화살표 연결선 20"/>
+            <p:cNvPr id="30" name="직선 화살표 연결선 29"/>
             <p:cNvCxnSpPr/>
             <p:nvPr/>
           </p:nvCxnSpPr>
           <p:spPr>
             <a:xfrm>
-              <a:off x="4000349" y="3677105"/>
+              <a:off x="3988637" y="2777029"/>
               <a:ext cx="960077" cy="0"/>
             </a:xfrm>
             <a:prstGeom prst="straightConnector1">
@@ -4705,42 +4638,7 @@
               <a:solidFill>
                 <a:schemeClr val="tx1"/>
               </a:solidFill>
-              <a:tailEnd type="triangle"/>
-            </a:ln>
-          </p:spPr>
-          <p:style>
-            <a:lnRef idx="1">
-              <a:schemeClr val="accent1"/>
-            </a:lnRef>
-            <a:fillRef idx="0">
-              <a:schemeClr val="accent1"/>
-            </a:fillRef>
-            <a:effectRef idx="0">
-              <a:schemeClr val="accent1"/>
-            </a:effectRef>
-            <a:fontRef idx="minor">
-              <a:schemeClr val="tx1"/>
-            </a:fontRef>
-          </p:style>
-        </p:cxnSp>
-        <p:cxnSp>
-          <p:nvCxnSpPr>
-            <p:cNvPr id="30" name="직선 화살표 연결선 29"/>
-            <p:cNvCxnSpPr/>
-            <p:nvPr/>
-          </p:nvCxnSpPr>
-          <p:spPr>
-            <a:xfrm>
-              <a:off x="3988637" y="2041924"/>
-              <a:ext cx="960077" cy="0"/>
-            </a:xfrm>
-            <a:prstGeom prst="straightConnector1">
-              <a:avLst/>
-            </a:prstGeom>
-            <a:ln w="15875">
-              <a:solidFill>
-                <a:schemeClr val="tx1"/>
-              </a:solidFill>
+              <a:headEnd type="triangle"/>
               <a:tailEnd type="triangle"/>
             </a:ln>
           </p:spPr>
@@ -5167,7 +5065,7 @@
                 <a:rPr lang="en-US" altLang="ko-KR" sz="1200" dirty="0" smtClean="0"/>
                 <a:t>Parking Garage</a:t>
               </a:r>
-              <a:endParaRPr lang="ko-KR" altLang="en-US" sz="1200"/>
+              <a:endParaRPr lang="ko-KR" altLang="en-US" sz="1200" dirty="0"/>
             </a:p>
           </p:txBody>
         </p:sp>
@@ -5432,42 +5330,6 @@
           </p:style>
         </p:cxnSp>
       </p:grpSp>
-      <p:sp>
-        <p:nvSpPr>
-          <p:cNvPr id="2" name="TextBox 1"/>
-          <p:cNvSpPr txBox="1"/>
-          <p:nvPr/>
-        </p:nvSpPr>
-        <p:spPr>
-          <a:xfrm>
-            <a:off x="3198940" y="2551512"/>
-            <a:ext cx="235962" cy="646331"/>
-          </a:xfrm>
-          <a:prstGeom prst="rect">
-            <a:avLst/>
-          </a:prstGeom>
-          <a:noFill/>
-        </p:spPr>
-        <p:txBody>
-          <a:bodyPr wrap="none" rtlCol="0">
-            <a:spAutoFit/>
-          </a:bodyPr>
-          <a:lstStyle/>
-          <a:p>
-            <a:r>
-              <a:rPr lang="en-US" altLang="ko-KR" dirty="0" smtClean="0"/>
-              <a:t>:</a:t>
-            </a:r>
-          </a:p>
-          <a:p>
-            <a:r>
-              <a:rPr lang="en-US" altLang="ko-KR" dirty="0"/>
-              <a:t>:</a:t>
-            </a:r>
-            <a:endParaRPr lang="ko-KR" altLang="en-US"/>
-          </a:p>
-        </p:txBody>
-      </p:sp>
     </p:spTree>
     <p:extLst>
       <p:ext uri="{BB962C8B-B14F-4D97-AF65-F5344CB8AC3E}">

</xml_diff>